<commit_message>
Atualização do index - adionando background e gif
</commit_message>
<xml_diff>
--- a/prototipo/prototipo site houston rockets.pptx
+++ b/prototipo/prototipo site houston rockets.pptx
@@ -106,6 +106,11 @@
       </a:defRPr>
     </a:lvl9pPr>
   </p:defaultTextStyle>
+  <p:extLst>
+    <p:ext uri="{EFAFB233-063F-42B5-8137-9DF3F51BA10A}">
+      <p15:sldGuideLst xmlns:p15="http://schemas.microsoft.com/office/powerpoint/2012/main"/>
+    </p:ext>
+  </p:extLst>
 </p:presentation>
 </file>
 
@@ -240,7 +245,7 @@
           <a:p>
             <a:fld id="{7DDFE85D-F81D-4715-8131-22D05CD419B0}" type="datetimeFigureOut">
               <a:rPr lang="pt-BR" smtClean="0"/>
-              <a:t>24/04/2020</a:t>
+              <a:t>06/05/2020</a:t>
             </a:fld>
             <a:endParaRPr lang="pt-BR"/>
           </a:p>
@@ -410,7 +415,7 @@
           <a:p>
             <a:fld id="{7DDFE85D-F81D-4715-8131-22D05CD419B0}" type="datetimeFigureOut">
               <a:rPr lang="pt-BR" smtClean="0"/>
-              <a:t>24/04/2020</a:t>
+              <a:t>06/05/2020</a:t>
             </a:fld>
             <a:endParaRPr lang="pt-BR"/>
           </a:p>
@@ -590,7 +595,7 @@
           <a:p>
             <a:fld id="{7DDFE85D-F81D-4715-8131-22D05CD419B0}" type="datetimeFigureOut">
               <a:rPr lang="pt-BR" smtClean="0"/>
-              <a:t>24/04/2020</a:t>
+              <a:t>06/05/2020</a:t>
             </a:fld>
             <a:endParaRPr lang="pt-BR"/>
           </a:p>
@@ -760,7 +765,7 @@
           <a:p>
             <a:fld id="{7DDFE85D-F81D-4715-8131-22D05CD419B0}" type="datetimeFigureOut">
               <a:rPr lang="pt-BR" smtClean="0"/>
-              <a:t>24/04/2020</a:t>
+              <a:t>06/05/2020</a:t>
             </a:fld>
             <a:endParaRPr lang="pt-BR"/>
           </a:p>
@@ -1006,7 +1011,7 @@
           <a:p>
             <a:fld id="{7DDFE85D-F81D-4715-8131-22D05CD419B0}" type="datetimeFigureOut">
               <a:rPr lang="pt-BR" smtClean="0"/>
-              <a:t>24/04/2020</a:t>
+              <a:t>06/05/2020</a:t>
             </a:fld>
             <a:endParaRPr lang="pt-BR"/>
           </a:p>
@@ -1238,7 +1243,7 @@
           <a:p>
             <a:fld id="{7DDFE85D-F81D-4715-8131-22D05CD419B0}" type="datetimeFigureOut">
               <a:rPr lang="pt-BR" smtClean="0"/>
-              <a:t>24/04/2020</a:t>
+              <a:t>06/05/2020</a:t>
             </a:fld>
             <a:endParaRPr lang="pt-BR"/>
           </a:p>
@@ -1605,7 +1610,7 @@
           <a:p>
             <a:fld id="{7DDFE85D-F81D-4715-8131-22D05CD419B0}" type="datetimeFigureOut">
               <a:rPr lang="pt-BR" smtClean="0"/>
-              <a:t>24/04/2020</a:t>
+              <a:t>06/05/2020</a:t>
             </a:fld>
             <a:endParaRPr lang="pt-BR"/>
           </a:p>
@@ -1723,7 +1728,7 @@
           <a:p>
             <a:fld id="{7DDFE85D-F81D-4715-8131-22D05CD419B0}" type="datetimeFigureOut">
               <a:rPr lang="pt-BR" smtClean="0"/>
-              <a:t>24/04/2020</a:t>
+              <a:t>06/05/2020</a:t>
             </a:fld>
             <a:endParaRPr lang="pt-BR"/>
           </a:p>
@@ -1818,7 +1823,7 @@
           <a:p>
             <a:fld id="{7DDFE85D-F81D-4715-8131-22D05CD419B0}" type="datetimeFigureOut">
               <a:rPr lang="pt-BR" smtClean="0"/>
-              <a:t>24/04/2020</a:t>
+              <a:t>06/05/2020</a:t>
             </a:fld>
             <a:endParaRPr lang="pt-BR"/>
           </a:p>
@@ -2095,7 +2100,7 @@
           <a:p>
             <a:fld id="{7DDFE85D-F81D-4715-8131-22D05CD419B0}" type="datetimeFigureOut">
               <a:rPr lang="pt-BR" smtClean="0"/>
-              <a:t>24/04/2020</a:t>
+              <a:t>06/05/2020</a:t>
             </a:fld>
             <a:endParaRPr lang="pt-BR"/>
           </a:p>
@@ -2348,7 +2353,7 @@
           <a:p>
             <a:fld id="{7DDFE85D-F81D-4715-8131-22D05CD419B0}" type="datetimeFigureOut">
               <a:rPr lang="pt-BR" smtClean="0"/>
-              <a:t>24/04/2020</a:t>
+              <a:t>06/05/2020</a:t>
             </a:fld>
             <a:endParaRPr lang="pt-BR"/>
           </a:p>
@@ -2561,7 +2566,7 @@
           <a:p>
             <a:fld id="{7DDFE85D-F81D-4715-8131-22D05CD419B0}" type="datetimeFigureOut">
               <a:rPr lang="pt-BR" smtClean="0"/>
-              <a:t>24/04/2020</a:t>
+              <a:t>06/05/2020</a:t>
             </a:fld>
             <a:endParaRPr lang="pt-BR"/>
           </a:p>

</xml_diff>

<commit_message>
Adicionando Historia do time ao layout
</commit_message>
<xml_diff>
--- a/prototipo/prototipo site houston rockets.pptx
+++ b/prototipo/prototipo site houston rockets.pptx
@@ -6,8 +6,9 @@
   </p:sldMasterIdLst>
   <p:sldIdLst>
     <p:sldId id="260" r:id="rId2"/>
-    <p:sldId id="258" r:id="rId3"/>
-    <p:sldId id="259" r:id="rId4"/>
+    <p:sldId id="261" r:id="rId3"/>
+    <p:sldId id="258" r:id="rId4"/>
+    <p:sldId id="259" r:id="rId5"/>
   </p:sldIdLst>
   <p:sldSz cx="12192000" cy="6858000"/>
   <p:notesSz cx="6858000" cy="9144000"/>
@@ -3439,10 +3440,7 @@
             <a:avLst/>
           </a:prstGeom>
           <a:solidFill>
-            <a:schemeClr val="tx1">
-              <a:lumMod val="85000"/>
-              <a:lumOff val="15000"/>
-            </a:schemeClr>
+            <a:srgbClr val="262626"/>
           </a:solidFill>
           <a:ln>
             <a:noFill/>
@@ -3737,6 +3735,724 @@
           <a:chExt cx="0" cy="0"/>
         </a:xfrm>
       </p:grpSpPr>
+      <p:sp>
+        <p:nvSpPr>
+          <p:cNvPr id="2" name="Retângulo 1"/>
+          <p:cNvSpPr/>
+          <p:nvPr/>
+        </p:nvSpPr>
+        <p:spPr>
+          <a:xfrm>
+            <a:off x="0" y="0"/>
+            <a:ext cx="12192000" cy="886265"/>
+          </a:xfrm>
+          <a:prstGeom prst="rect">
+            <a:avLst/>
+          </a:prstGeom>
+          <a:gradFill flip="none" rotWithShape="1">
+            <a:gsLst>
+              <a:gs pos="0">
+                <a:srgbClr val="FF0000"/>
+              </a:gs>
+              <a:gs pos="23000">
+                <a:srgbClr val="C00000"/>
+              </a:gs>
+              <a:gs pos="51000">
+                <a:schemeClr val="accent2"/>
+              </a:gs>
+              <a:gs pos="95000">
+                <a:srgbClr val="FF0101"/>
+              </a:gs>
+            </a:gsLst>
+            <a:path path="circle">
+              <a:fillToRect l="100000" t="100000"/>
+            </a:path>
+            <a:tileRect r="-100000" b="-100000"/>
+          </a:gradFill>
+        </p:spPr>
+        <p:style>
+          <a:lnRef idx="2">
+            <a:schemeClr val="accent1">
+              <a:shade val="50000"/>
+            </a:schemeClr>
+          </a:lnRef>
+          <a:fillRef idx="1">
+            <a:schemeClr val="accent1"/>
+          </a:fillRef>
+          <a:effectRef idx="0">
+            <a:schemeClr val="accent1"/>
+          </a:effectRef>
+          <a:fontRef idx="minor">
+            <a:schemeClr val="lt1"/>
+          </a:fontRef>
+        </p:style>
+        <p:txBody>
+          <a:bodyPr rtlCol="0" anchor="ctr"/>
+          <a:lstStyle/>
+          <a:p>
+            <a:pPr algn="ctr"/>
+            <a:endParaRPr lang="pt-BR" dirty="0"/>
+          </a:p>
+        </p:txBody>
+      </p:sp>
+      <p:sp>
+        <p:nvSpPr>
+          <p:cNvPr id="4" name="CaixaDeTexto 3"/>
+          <p:cNvSpPr txBox="1"/>
+          <p:nvPr/>
+        </p:nvSpPr>
+        <p:spPr>
+          <a:xfrm>
+            <a:off x="377482" y="388444"/>
+            <a:ext cx="736099" cy="369332"/>
+          </a:xfrm>
+          <a:prstGeom prst="rect">
+            <a:avLst/>
+          </a:prstGeom>
+          <a:noFill/>
+        </p:spPr>
+        <p:txBody>
+          <a:bodyPr wrap="none" rtlCol="0">
+            <a:spAutoFit/>
+          </a:bodyPr>
+          <a:lstStyle/>
+          <a:p>
+            <a:r>
+              <a:rPr lang="pt-BR" b="1" dirty="0" smtClean="0">
+                <a:solidFill>
+                  <a:schemeClr val="bg1"/>
+                </a:solidFill>
+                <a:latin typeface="Arial" panose="020B0604020202020204" pitchFamily="34" charset="0"/>
+                <a:cs typeface="Arial" panose="020B0604020202020204" pitchFamily="34" charset="0"/>
+              </a:rPr>
+              <a:t>TIME</a:t>
+            </a:r>
+            <a:endParaRPr lang="pt-BR" b="1" dirty="0">
+              <a:solidFill>
+                <a:schemeClr val="bg1"/>
+              </a:solidFill>
+              <a:latin typeface="Arial" panose="020B0604020202020204" pitchFamily="34" charset="0"/>
+              <a:cs typeface="Arial" panose="020B0604020202020204" pitchFamily="34" charset="0"/>
+            </a:endParaRPr>
+          </a:p>
+        </p:txBody>
+      </p:sp>
+      <p:sp>
+        <p:nvSpPr>
+          <p:cNvPr id="5" name="CaixaDeTexto 4"/>
+          <p:cNvSpPr txBox="1"/>
+          <p:nvPr/>
+        </p:nvSpPr>
+        <p:spPr>
+          <a:xfrm>
+            <a:off x="1221545" y="388444"/>
+            <a:ext cx="1005403" cy="369332"/>
+          </a:xfrm>
+          <a:prstGeom prst="rect">
+            <a:avLst/>
+          </a:prstGeom>
+          <a:noFill/>
+        </p:spPr>
+        <p:txBody>
+          <a:bodyPr wrap="none" rtlCol="0">
+            <a:spAutoFit/>
+          </a:bodyPr>
+          <a:lstStyle/>
+          <a:p>
+            <a:r>
+              <a:rPr lang="pt-BR" b="1" dirty="0" smtClean="0">
+                <a:solidFill>
+                  <a:schemeClr val="bg1"/>
+                </a:solidFill>
+                <a:latin typeface="Arial" panose="020B0604020202020204" pitchFamily="34" charset="0"/>
+                <a:cs typeface="Arial" panose="020B0604020202020204" pitchFamily="34" charset="0"/>
+              </a:rPr>
+              <a:t>SOBRE</a:t>
+            </a:r>
+            <a:endParaRPr lang="pt-BR" b="1" dirty="0">
+              <a:solidFill>
+                <a:schemeClr val="bg1"/>
+              </a:solidFill>
+              <a:latin typeface="Arial" panose="020B0604020202020204" pitchFamily="34" charset="0"/>
+              <a:cs typeface="Arial" panose="020B0604020202020204" pitchFamily="34" charset="0"/>
+            </a:endParaRPr>
+          </a:p>
+        </p:txBody>
+      </p:sp>
+      <p:sp>
+        <p:nvSpPr>
+          <p:cNvPr id="6" name="CaixaDeTexto 5"/>
+          <p:cNvSpPr txBox="1"/>
+          <p:nvPr/>
+        </p:nvSpPr>
+        <p:spPr>
+          <a:xfrm>
+            <a:off x="2334912" y="388444"/>
+            <a:ext cx="1326004" cy="369332"/>
+          </a:xfrm>
+          <a:prstGeom prst="rect">
+            <a:avLst/>
+          </a:prstGeom>
+          <a:noFill/>
+        </p:spPr>
+        <p:txBody>
+          <a:bodyPr wrap="none" rtlCol="0">
+            <a:spAutoFit/>
+          </a:bodyPr>
+          <a:lstStyle/>
+          <a:p>
+            <a:r>
+              <a:rPr lang="pt-BR" b="1" dirty="0" smtClean="0">
+                <a:solidFill>
+                  <a:schemeClr val="bg1"/>
+                </a:solidFill>
+                <a:latin typeface="Arial" panose="020B0604020202020204" pitchFamily="34" charset="0"/>
+                <a:cs typeface="Arial" panose="020B0604020202020204" pitchFamily="34" charset="0"/>
+              </a:rPr>
+              <a:t>PORQUE?</a:t>
+            </a:r>
+            <a:endParaRPr lang="pt-BR" b="1" dirty="0">
+              <a:solidFill>
+                <a:schemeClr val="bg1"/>
+              </a:solidFill>
+              <a:latin typeface="Arial" panose="020B0604020202020204" pitchFamily="34" charset="0"/>
+              <a:cs typeface="Arial" panose="020B0604020202020204" pitchFamily="34" charset="0"/>
+            </a:endParaRPr>
+          </a:p>
+        </p:txBody>
+      </p:sp>
+      <p:sp>
+        <p:nvSpPr>
+          <p:cNvPr id="9" name="Retângulo 8"/>
+          <p:cNvSpPr/>
+          <p:nvPr/>
+        </p:nvSpPr>
+        <p:spPr>
+          <a:xfrm>
+            <a:off x="0" y="886265"/>
+            <a:ext cx="12192000" cy="5971735"/>
+          </a:xfrm>
+          <a:prstGeom prst="rect">
+            <a:avLst/>
+          </a:prstGeom>
+          <a:solidFill>
+            <a:schemeClr val="tx1"/>
+          </a:solidFill>
+          <a:ln>
+            <a:noFill/>
+          </a:ln>
+        </p:spPr>
+        <p:style>
+          <a:lnRef idx="2">
+            <a:schemeClr val="accent1">
+              <a:shade val="50000"/>
+            </a:schemeClr>
+          </a:lnRef>
+          <a:fillRef idx="1">
+            <a:schemeClr val="accent1"/>
+          </a:fillRef>
+          <a:effectRef idx="0">
+            <a:schemeClr val="accent1"/>
+          </a:effectRef>
+          <a:fontRef idx="minor">
+            <a:schemeClr val="lt1"/>
+          </a:fontRef>
+        </p:style>
+        <p:txBody>
+          <a:bodyPr rtlCol="0" anchor="ctr"/>
+          <a:lstStyle/>
+          <a:p>
+            <a:pPr algn="ctr"/>
+            <a:endParaRPr lang="pt-BR" dirty="0"/>
+          </a:p>
+        </p:txBody>
+      </p:sp>
+      <p:pic>
+        <p:nvPicPr>
+          <p:cNvPr id="3" name="Imagem 2"/>
+          <p:cNvPicPr>
+            <a:picLocks noChangeAspect="1"/>
+          </p:cNvPicPr>
+          <p:nvPr/>
+        </p:nvPicPr>
+        <p:blipFill>
+          <a:blip r:embed="rId2" cstate="print">
+            <a:extLst>
+              <a:ext uri="{28A0092B-C50C-407E-A947-70E740481C1C}">
+                <a14:useLocalDpi xmlns:a14="http://schemas.microsoft.com/office/drawing/2010/main" val="0"/>
+              </a:ext>
+            </a:extLst>
+          </a:blip>
+          <a:stretch>
+            <a:fillRect/>
+          </a:stretch>
+        </p:blipFill>
+        <p:spPr>
+          <a:xfrm>
+            <a:off x="5511678" y="-1"/>
+            <a:ext cx="1168644" cy="1128487"/>
+          </a:xfrm>
+          <a:prstGeom prst="rect">
+            <a:avLst/>
+          </a:prstGeom>
+        </p:spPr>
+      </p:pic>
+      <p:sp>
+        <p:nvSpPr>
+          <p:cNvPr id="7" name="CaixaDeTexto 6"/>
+          <p:cNvSpPr txBox="1"/>
+          <p:nvPr/>
+        </p:nvSpPr>
+        <p:spPr>
+          <a:xfrm>
+            <a:off x="103063" y="1341508"/>
+            <a:ext cx="1983314" cy="400110"/>
+          </a:xfrm>
+          <a:prstGeom prst="rect">
+            <a:avLst/>
+          </a:prstGeom>
+          <a:noFill/>
+        </p:spPr>
+        <p:txBody>
+          <a:bodyPr wrap="square" rtlCol="0">
+            <a:spAutoFit/>
+          </a:bodyPr>
+          <a:lstStyle/>
+          <a:p>
+            <a:r>
+              <a:rPr lang="pt-BR" sz="2000" b="1" dirty="0" smtClean="0">
+                <a:solidFill>
+                  <a:schemeClr val="bg1"/>
+                </a:solidFill>
+                <a:latin typeface="Arial" panose="020B0604020202020204" pitchFamily="34" charset="0"/>
+                <a:cs typeface="Arial" panose="020B0604020202020204" pitchFamily="34" charset="0"/>
+              </a:rPr>
+              <a:t>ARMADORES</a:t>
+            </a:r>
+            <a:endParaRPr lang="pt-BR" b="1" dirty="0">
+              <a:solidFill>
+                <a:schemeClr val="bg1"/>
+              </a:solidFill>
+              <a:latin typeface="Arial" panose="020B0604020202020204" pitchFamily="34" charset="0"/>
+              <a:cs typeface="Arial" panose="020B0604020202020204" pitchFamily="34" charset="0"/>
+            </a:endParaRPr>
+          </a:p>
+        </p:txBody>
+      </p:sp>
+      <p:cxnSp>
+        <p:nvCxnSpPr>
+          <p:cNvPr id="13" name="Conector reto 12"/>
+          <p:cNvCxnSpPr/>
+          <p:nvPr/>
+        </p:nvCxnSpPr>
+        <p:spPr>
+          <a:xfrm>
+            <a:off x="231818" y="1256975"/>
+            <a:ext cx="11848563" cy="0"/>
+          </a:xfrm>
+          <a:prstGeom prst="line">
+            <a:avLst/>
+          </a:prstGeom>
+          <a:ln>
+            <a:gradFill>
+              <a:gsLst>
+                <a:gs pos="0">
+                  <a:srgbClr val="FF0000"/>
+                </a:gs>
+                <a:gs pos="74000">
+                  <a:srgbClr val="C00000"/>
+                </a:gs>
+                <a:gs pos="83000">
+                  <a:schemeClr val="accent4"/>
+                </a:gs>
+                <a:gs pos="100000">
+                  <a:srgbClr val="FFC000"/>
+                </a:gs>
+              </a:gsLst>
+              <a:lin ang="5400000" scaled="1"/>
+            </a:gradFill>
+          </a:ln>
+        </p:spPr>
+        <p:style>
+          <a:lnRef idx="1">
+            <a:schemeClr val="accent1"/>
+          </a:lnRef>
+          <a:fillRef idx="0">
+            <a:schemeClr val="accent1"/>
+          </a:fillRef>
+          <a:effectRef idx="0">
+            <a:schemeClr val="accent1"/>
+          </a:effectRef>
+          <a:fontRef idx="minor">
+            <a:schemeClr val="tx1"/>
+          </a:fontRef>
+        </p:style>
+      </p:cxnSp>
+      <p:sp>
+        <p:nvSpPr>
+          <p:cNvPr id="24" name="Retângulo 23"/>
+          <p:cNvSpPr/>
+          <p:nvPr/>
+        </p:nvSpPr>
+        <p:spPr>
+          <a:xfrm>
+            <a:off x="1030309" y="2137274"/>
+            <a:ext cx="2112135" cy="2910626"/>
+          </a:xfrm>
+          <a:prstGeom prst="rect">
+            <a:avLst/>
+          </a:prstGeom>
+        </p:spPr>
+        <p:style>
+          <a:lnRef idx="2">
+            <a:schemeClr val="accent1">
+              <a:shade val="50000"/>
+            </a:schemeClr>
+          </a:lnRef>
+          <a:fillRef idx="1">
+            <a:schemeClr val="accent1"/>
+          </a:fillRef>
+          <a:effectRef idx="0">
+            <a:schemeClr val="accent1"/>
+          </a:effectRef>
+          <a:fontRef idx="minor">
+            <a:schemeClr val="lt1"/>
+          </a:fontRef>
+        </p:style>
+        <p:txBody>
+          <a:bodyPr rtlCol="0" anchor="ctr"/>
+          <a:lstStyle/>
+          <a:p>
+            <a:pPr algn="ctr"/>
+            <a:endParaRPr lang="pt-BR"/>
+          </a:p>
+        </p:txBody>
+      </p:sp>
+      <p:sp>
+        <p:nvSpPr>
+          <p:cNvPr id="25" name="Retângulo 24"/>
+          <p:cNvSpPr/>
+          <p:nvPr/>
+        </p:nvSpPr>
+        <p:spPr>
+          <a:xfrm>
+            <a:off x="6494884" y="2111566"/>
+            <a:ext cx="2112135" cy="2910626"/>
+          </a:xfrm>
+          <a:prstGeom prst="rect">
+            <a:avLst/>
+          </a:prstGeom>
+        </p:spPr>
+        <p:style>
+          <a:lnRef idx="2">
+            <a:schemeClr val="accent1">
+              <a:shade val="50000"/>
+            </a:schemeClr>
+          </a:lnRef>
+          <a:fillRef idx="1">
+            <a:schemeClr val="accent1"/>
+          </a:fillRef>
+          <a:effectRef idx="0">
+            <a:schemeClr val="accent1"/>
+          </a:effectRef>
+          <a:fontRef idx="minor">
+            <a:schemeClr val="lt1"/>
+          </a:fontRef>
+        </p:style>
+        <p:txBody>
+          <a:bodyPr rtlCol="0" anchor="ctr"/>
+          <a:lstStyle/>
+          <a:p>
+            <a:pPr algn="ctr"/>
+            <a:endParaRPr lang="pt-BR"/>
+          </a:p>
+        </p:txBody>
+      </p:sp>
+      <p:sp>
+        <p:nvSpPr>
+          <p:cNvPr id="26" name="Retângulo 25"/>
+          <p:cNvSpPr/>
+          <p:nvPr/>
+        </p:nvSpPr>
+        <p:spPr>
+          <a:xfrm>
+            <a:off x="9145788" y="2043718"/>
+            <a:ext cx="2112135" cy="2910626"/>
+          </a:xfrm>
+          <a:prstGeom prst="rect">
+            <a:avLst/>
+          </a:prstGeom>
+        </p:spPr>
+        <p:style>
+          <a:lnRef idx="2">
+            <a:schemeClr val="accent1">
+              <a:shade val="50000"/>
+            </a:schemeClr>
+          </a:lnRef>
+          <a:fillRef idx="1">
+            <a:schemeClr val="accent1"/>
+          </a:fillRef>
+          <a:effectRef idx="0">
+            <a:schemeClr val="accent1"/>
+          </a:effectRef>
+          <a:fontRef idx="minor">
+            <a:schemeClr val="lt1"/>
+          </a:fontRef>
+        </p:style>
+        <p:txBody>
+          <a:bodyPr rtlCol="0" anchor="ctr"/>
+          <a:lstStyle/>
+          <a:p>
+            <a:pPr algn="ctr"/>
+            <a:endParaRPr lang="pt-BR"/>
+          </a:p>
+        </p:txBody>
+      </p:sp>
+      <p:sp>
+        <p:nvSpPr>
+          <p:cNvPr id="27" name="Retângulo 26"/>
+          <p:cNvSpPr/>
+          <p:nvPr/>
+        </p:nvSpPr>
+        <p:spPr>
+          <a:xfrm>
+            <a:off x="3843980" y="2111566"/>
+            <a:ext cx="2112135" cy="2910626"/>
+          </a:xfrm>
+          <a:prstGeom prst="rect">
+            <a:avLst/>
+          </a:prstGeom>
+        </p:spPr>
+        <p:style>
+          <a:lnRef idx="2">
+            <a:schemeClr val="accent1">
+              <a:shade val="50000"/>
+            </a:schemeClr>
+          </a:lnRef>
+          <a:fillRef idx="1">
+            <a:schemeClr val="accent1"/>
+          </a:fillRef>
+          <a:effectRef idx="0">
+            <a:schemeClr val="accent1"/>
+          </a:effectRef>
+          <a:fontRef idx="minor">
+            <a:schemeClr val="lt1"/>
+          </a:fontRef>
+        </p:style>
+        <p:txBody>
+          <a:bodyPr rtlCol="0" anchor="ctr"/>
+          <a:lstStyle/>
+          <a:p>
+            <a:pPr algn="ctr"/>
+            <a:endParaRPr lang="pt-BR"/>
+          </a:p>
+        </p:txBody>
+      </p:sp>
+      <p:sp>
+        <p:nvSpPr>
+          <p:cNvPr id="28" name="CaixaDeTexto 27"/>
+          <p:cNvSpPr txBox="1"/>
+          <p:nvPr/>
+        </p:nvSpPr>
+        <p:spPr>
+          <a:xfrm>
+            <a:off x="1629053" y="1761137"/>
+            <a:ext cx="864339" cy="369332"/>
+          </a:xfrm>
+          <a:prstGeom prst="rect">
+            <a:avLst/>
+          </a:prstGeom>
+          <a:noFill/>
+        </p:spPr>
+        <p:txBody>
+          <a:bodyPr wrap="none" rtlCol="0">
+            <a:spAutoFit/>
+          </a:bodyPr>
+          <a:lstStyle/>
+          <a:p>
+            <a:r>
+              <a:rPr lang="pt-BR" dirty="0" smtClean="0">
+                <a:solidFill>
+                  <a:schemeClr val="bg1"/>
+                </a:solidFill>
+                <a:latin typeface="Arial" panose="020B0604020202020204" pitchFamily="34" charset="0"/>
+                <a:cs typeface="Arial" panose="020B0604020202020204" pitchFamily="34" charset="0"/>
+              </a:rPr>
+              <a:t>Haden</a:t>
+            </a:r>
+            <a:endParaRPr lang="pt-BR" dirty="0">
+              <a:solidFill>
+                <a:schemeClr val="bg1"/>
+              </a:solidFill>
+              <a:latin typeface="Arial" panose="020B0604020202020204" pitchFamily="34" charset="0"/>
+              <a:cs typeface="Arial" panose="020B0604020202020204" pitchFamily="34" charset="0"/>
+            </a:endParaRPr>
+          </a:p>
+        </p:txBody>
+      </p:sp>
+      <p:sp>
+        <p:nvSpPr>
+          <p:cNvPr id="29" name="CaixaDeTexto 28"/>
+          <p:cNvSpPr txBox="1"/>
+          <p:nvPr/>
+        </p:nvSpPr>
+        <p:spPr>
+          <a:xfrm>
+            <a:off x="9789080" y="1741618"/>
+            <a:ext cx="864339" cy="369332"/>
+          </a:xfrm>
+          <a:prstGeom prst="rect">
+            <a:avLst/>
+          </a:prstGeom>
+          <a:noFill/>
+        </p:spPr>
+        <p:txBody>
+          <a:bodyPr wrap="none" rtlCol="0">
+            <a:spAutoFit/>
+          </a:bodyPr>
+          <a:lstStyle/>
+          <a:p>
+            <a:r>
+              <a:rPr lang="pt-BR" dirty="0" smtClean="0">
+                <a:solidFill>
+                  <a:schemeClr val="bg1"/>
+                </a:solidFill>
+                <a:latin typeface="Arial" panose="020B0604020202020204" pitchFamily="34" charset="0"/>
+                <a:cs typeface="Arial" panose="020B0604020202020204" pitchFamily="34" charset="0"/>
+              </a:rPr>
+              <a:t>Haden</a:t>
+            </a:r>
+            <a:endParaRPr lang="pt-BR" dirty="0">
+              <a:solidFill>
+                <a:schemeClr val="bg1"/>
+              </a:solidFill>
+              <a:latin typeface="Arial" panose="020B0604020202020204" pitchFamily="34" charset="0"/>
+              <a:cs typeface="Arial" panose="020B0604020202020204" pitchFamily="34" charset="0"/>
+            </a:endParaRPr>
+          </a:p>
+        </p:txBody>
+      </p:sp>
+      <p:sp>
+        <p:nvSpPr>
+          <p:cNvPr id="30" name="CaixaDeTexto 29"/>
+          <p:cNvSpPr txBox="1"/>
+          <p:nvPr/>
+        </p:nvSpPr>
+        <p:spPr>
+          <a:xfrm>
+            <a:off x="7118782" y="1767942"/>
+            <a:ext cx="864339" cy="369332"/>
+          </a:xfrm>
+          <a:prstGeom prst="rect">
+            <a:avLst/>
+          </a:prstGeom>
+          <a:noFill/>
+        </p:spPr>
+        <p:txBody>
+          <a:bodyPr wrap="none" rtlCol="0">
+            <a:spAutoFit/>
+          </a:bodyPr>
+          <a:lstStyle/>
+          <a:p>
+            <a:r>
+              <a:rPr lang="pt-BR" dirty="0" smtClean="0">
+                <a:solidFill>
+                  <a:schemeClr val="bg1"/>
+                </a:solidFill>
+                <a:latin typeface="Arial" panose="020B0604020202020204" pitchFamily="34" charset="0"/>
+                <a:cs typeface="Arial" panose="020B0604020202020204" pitchFamily="34" charset="0"/>
+              </a:rPr>
+              <a:t>Haden</a:t>
+            </a:r>
+            <a:endParaRPr lang="pt-BR" dirty="0">
+              <a:solidFill>
+                <a:schemeClr val="bg1"/>
+              </a:solidFill>
+              <a:latin typeface="Arial" panose="020B0604020202020204" pitchFamily="34" charset="0"/>
+              <a:cs typeface="Arial" panose="020B0604020202020204" pitchFamily="34" charset="0"/>
+            </a:endParaRPr>
+          </a:p>
+        </p:txBody>
+      </p:sp>
+      <p:sp>
+        <p:nvSpPr>
+          <p:cNvPr id="31" name="CaixaDeTexto 30"/>
+          <p:cNvSpPr txBox="1"/>
+          <p:nvPr/>
+        </p:nvSpPr>
+        <p:spPr>
+          <a:xfrm>
+            <a:off x="4467878" y="1767942"/>
+            <a:ext cx="864339" cy="369332"/>
+          </a:xfrm>
+          <a:prstGeom prst="rect">
+            <a:avLst/>
+          </a:prstGeom>
+          <a:noFill/>
+        </p:spPr>
+        <p:txBody>
+          <a:bodyPr wrap="none" rtlCol="0">
+            <a:spAutoFit/>
+          </a:bodyPr>
+          <a:lstStyle/>
+          <a:p>
+            <a:r>
+              <a:rPr lang="pt-BR" dirty="0" smtClean="0">
+                <a:solidFill>
+                  <a:schemeClr val="bg1"/>
+                </a:solidFill>
+                <a:latin typeface="Arial" panose="020B0604020202020204" pitchFamily="34" charset="0"/>
+                <a:cs typeface="Arial" panose="020B0604020202020204" pitchFamily="34" charset="0"/>
+              </a:rPr>
+              <a:t>Haden</a:t>
+            </a:r>
+            <a:endParaRPr lang="pt-BR" dirty="0">
+              <a:solidFill>
+                <a:schemeClr val="bg1"/>
+              </a:solidFill>
+              <a:latin typeface="Arial" panose="020B0604020202020204" pitchFamily="34" charset="0"/>
+              <a:cs typeface="Arial" panose="020B0604020202020204" pitchFamily="34" charset="0"/>
+            </a:endParaRPr>
+          </a:p>
+        </p:txBody>
+      </p:sp>
+    </p:spTree>
+    <p:extLst>
+      <p:ext uri="{BB962C8B-B14F-4D97-AF65-F5344CB8AC3E}">
+        <p14:creationId xmlns:p14="http://schemas.microsoft.com/office/powerpoint/2010/main" val="3508879468"/>
+      </p:ext>
+    </p:extLst>
+  </p:cSld>
+  <p:clrMapOvr>
+    <a:masterClrMapping/>
+  </p:clrMapOvr>
+  <p:timing>
+    <p:tnLst>
+      <p:par>
+        <p:cTn id="1" dur="indefinite" restart="never" nodeType="tmRoot"/>
+      </p:par>
+    </p:tnLst>
+  </p:timing>
+</p:sld>
+</file>
+
+<file path=ppt/slides/slide3.xml><?xml version="1.0" encoding="utf-8"?>
+<p:sld xmlns:a="http://schemas.openxmlformats.org/drawingml/2006/main" xmlns:r="http://schemas.openxmlformats.org/officeDocument/2006/relationships" xmlns:p="http://schemas.openxmlformats.org/presentationml/2006/main">
+  <p:cSld>
+    <p:spTree>
+      <p:nvGrpSpPr>
+        <p:cNvPr id="1" name=""/>
+        <p:cNvGrpSpPr/>
+        <p:nvPr/>
+      </p:nvGrpSpPr>
+      <p:grpSpPr>
+        <a:xfrm>
+          <a:off x="0" y="0"/>
+          <a:ext cx="0" cy="0"/>
+          <a:chOff x="0" y="0"/>
+          <a:chExt cx="0" cy="0"/>
+        </a:xfrm>
+      </p:grpSpPr>
     </p:spTree>
     <p:extLst>
       <p:ext uri="{BB962C8B-B14F-4D97-AF65-F5344CB8AC3E}">
@@ -3757,7 +4473,7 @@
 </p:sld>
 </file>
 
-<file path=ppt/slides/slide3.xml><?xml version="1.0" encoding="utf-8"?>
+<file path=ppt/slides/slide4.xml><?xml version="1.0" encoding="utf-8"?>
 <p:sld xmlns:a="http://schemas.openxmlformats.org/drawingml/2006/main" xmlns:r="http://schemas.openxmlformats.org/officeDocument/2006/relationships" xmlns:p="http://schemas.openxmlformats.org/presentationml/2006/main">
   <p:cSld>
     <p:spTree>

</xml_diff>